<commit_message>
Add figure for cluster registers
</commit_message>
<xml_diff>
--- a/docs/figures/figures.pptx
+++ b/docs/figures/figures.pptx
@@ -6,6 +6,7 @@
   </p:sldMasterIdLst>
   <p:sldIdLst>
     <p:sldId id="257" r:id="rId2"/>
+    <p:sldId id="258" r:id="rId3"/>
   </p:sldIdLst>
   <p:sldSz cx="12192000" cy="6858000"/>
   <p:notesSz cx="6858000" cy="9144000"/>
@@ -3845,6 +3846,130 @@
 </p:sld>
 </file>
 
+<file path=ppt/slides/slide2.xml><?xml version="1.0" encoding="utf-8"?>
+<p:sld xmlns:a="http://schemas.openxmlformats.org/drawingml/2006/main" xmlns:r="http://schemas.openxmlformats.org/officeDocument/2006/relationships" xmlns:p="http://schemas.openxmlformats.org/presentationml/2006/main">
+  <p:cSld>
+    <p:spTree>
+      <p:nvGrpSpPr>
+        <p:cNvPr id="1" name=""/>
+        <p:cNvGrpSpPr/>
+        <p:nvPr/>
+      </p:nvGrpSpPr>
+      <p:grpSpPr>
+        <a:xfrm>
+          <a:off x="0" y="0"/>
+          <a:ext cx="0" cy="0"/>
+          <a:chOff x="0" y="0"/>
+          <a:chExt cx="0" cy="0"/>
+        </a:xfrm>
+      </p:grpSpPr>
+      <p:sp>
+        <p:nvSpPr>
+          <p:cNvPr id="8" name="TextBox 7">
+            <a:extLst>
+              <a:ext uri="{FF2B5EF4-FFF2-40B4-BE49-F238E27FC236}">
+                <a16:creationId xmlns:a16="http://schemas.microsoft.com/office/drawing/2014/main" id="{963AD41F-43C9-2E27-AE48-2BFB88732422}"/>
+              </a:ext>
+            </a:extLst>
+          </p:cNvPr>
+          <p:cNvSpPr txBox="1"/>
+          <p:nvPr/>
+        </p:nvSpPr>
+        <p:spPr>
+          <a:xfrm>
+            <a:off x="5417769" y="3238292"/>
+            <a:ext cx="1356462" cy="338554"/>
+          </a:xfrm>
+          <a:prstGeom prst="rect">
+            <a:avLst/>
+          </a:prstGeom>
+          <a:noFill/>
+        </p:spPr>
+        <p:txBody>
+          <a:bodyPr wrap="none" rtlCol="0">
+            <a:spAutoFit/>
+          </a:bodyPr>
+          <a:lstStyle/>
+          <a:p>
+            <a:r>
+              <a:rPr lang="en-US" sz="1600" dirty="0">
+                <a:latin typeface="Avenir Book" panose="02000503020000020003" pitchFamily="2" charset="0"/>
+              </a:rPr>
+              <a:t>Second slide</a:t>
+            </a:r>
+            <a:endParaRPr lang="en-US" sz="1200" dirty="0">
+              <a:latin typeface="Avenir Book" panose="02000503020000020003" pitchFamily="2" charset="0"/>
+            </a:endParaRPr>
+          </a:p>
+        </p:txBody>
+      </p:sp>
+      <p:sp>
+        <p:nvSpPr>
+          <p:cNvPr id="12" name="Rectangle 11">
+            <a:extLst>
+              <a:ext uri="{FF2B5EF4-FFF2-40B4-BE49-F238E27FC236}">
+                <a16:creationId xmlns:a16="http://schemas.microsoft.com/office/drawing/2014/main" id="{53A239F0-9EF5-41F4-B7C9-9C3B5BB509D1}"/>
+              </a:ext>
+            </a:extLst>
+          </p:cNvPr>
+          <p:cNvSpPr/>
+          <p:nvPr/>
+        </p:nvSpPr>
+        <p:spPr>
+          <a:xfrm>
+            <a:off x="171450" y="471488"/>
+            <a:ext cx="11872913" cy="5872162"/>
+          </a:xfrm>
+          <a:prstGeom prst="rect">
+            <a:avLst/>
+          </a:prstGeom>
+          <a:noFill/>
+          <a:ln>
+            <a:solidFill>
+              <a:schemeClr val="bg1">
+                <a:lumMod val="85000"/>
+              </a:schemeClr>
+            </a:solidFill>
+          </a:ln>
+        </p:spPr>
+        <p:style>
+          <a:lnRef idx="2">
+            <a:schemeClr val="accent1">
+              <a:shade val="50000"/>
+            </a:schemeClr>
+          </a:lnRef>
+          <a:fillRef idx="1">
+            <a:schemeClr val="accent1"/>
+          </a:fillRef>
+          <a:effectRef idx="0">
+            <a:schemeClr val="accent1"/>
+          </a:effectRef>
+          <a:fontRef idx="minor">
+            <a:schemeClr val="lt1"/>
+          </a:fontRef>
+        </p:style>
+        <p:txBody>
+          <a:bodyPr rtlCol="0" anchor="ctr"/>
+          <a:lstStyle/>
+          <a:p>
+            <a:pPr algn="ctr"/>
+            <a:endParaRPr lang="en-US"/>
+          </a:p>
+        </p:txBody>
+      </p:sp>
+    </p:spTree>
+    <p:extLst>
+      <p:ext uri="{BB962C8B-B14F-4D97-AF65-F5344CB8AC3E}">
+        <p14:creationId xmlns:p14="http://schemas.microsoft.com/office/powerpoint/2010/main" val="2275931222"/>
+      </p:ext>
+    </p:extLst>
+  </p:cSld>
+  <p:clrMapOvr>
+    <a:masterClrMapping/>
+  </p:clrMapOvr>
+</p:sld>
+</file>
+
 <file path=ppt/theme/theme1.xml><?xml version="1.0" encoding="utf-8"?>
 <a:theme xmlns:a="http://schemas.openxmlformats.org/drawingml/2006/main" name="Office Theme">
   <a:themeElements>

</xml_diff>

<commit_message>
Add QFT example circuit figure
</commit_message>
<xml_diff>
--- a/docs/figures/figures.pptx
+++ b/docs/figures/figures.pptx
@@ -5,8 +5,8 @@
     <p:sldMasterId id="2147483648" r:id="rId1"/>
   </p:sldMasterIdLst>
   <p:sldIdLst>
-    <p:sldId id="257" r:id="rId2"/>
-    <p:sldId id="258" r:id="rId3"/>
+    <p:sldId id="258" r:id="rId2"/>
+    <p:sldId id="257" r:id="rId3"/>
   </p:sldIdLst>
   <p:sldSz cx="12192000" cy="6858000"/>
   <p:notesSz cx="6858000" cy="9144000"/>
@@ -3327,6 +3327,170 @@
           <a:chExt cx="0" cy="0"/>
         </a:xfrm>
       </p:grpSpPr>
+      <p:sp>
+        <p:nvSpPr>
+          <p:cNvPr id="12" name="Rectangle 11">
+            <a:extLst>
+              <a:ext uri="{FF2B5EF4-FFF2-40B4-BE49-F238E27FC236}">
+                <a16:creationId xmlns:a16="http://schemas.microsoft.com/office/drawing/2014/main" id="{53A239F0-9EF5-41F4-B7C9-9C3B5BB509D1}"/>
+              </a:ext>
+            </a:extLst>
+          </p:cNvPr>
+          <p:cNvSpPr/>
+          <p:nvPr/>
+        </p:nvSpPr>
+        <p:spPr>
+          <a:xfrm>
+            <a:off x="171450" y="1660634"/>
+            <a:ext cx="11872913" cy="3493870"/>
+          </a:xfrm>
+          <a:prstGeom prst="rect">
+            <a:avLst/>
+          </a:prstGeom>
+          <a:noFill/>
+          <a:ln>
+            <a:solidFill>
+              <a:schemeClr val="bg1">
+                <a:lumMod val="85000"/>
+              </a:schemeClr>
+            </a:solidFill>
+          </a:ln>
+        </p:spPr>
+        <p:style>
+          <a:lnRef idx="2">
+            <a:schemeClr val="accent1">
+              <a:shade val="50000"/>
+            </a:schemeClr>
+          </a:lnRef>
+          <a:fillRef idx="1">
+            <a:schemeClr val="accent1"/>
+          </a:fillRef>
+          <a:effectRef idx="0">
+            <a:schemeClr val="accent1"/>
+          </a:effectRef>
+          <a:fontRef idx="minor">
+            <a:schemeClr val="lt1"/>
+          </a:fontRef>
+        </p:style>
+        <p:txBody>
+          <a:bodyPr rtlCol="0" anchor="ctr"/>
+          <a:lstStyle/>
+          <a:p>
+            <a:pPr algn="ctr"/>
+            <a:endParaRPr lang="en-US"/>
+          </a:p>
+        </p:txBody>
+      </p:sp>
+      <p:pic>
+        <p:nvPicPr>
+          <p:cNvPr id="2" name="Picture 1">
+            <a:extLst>
+              <a:ext uri="{FF2B5EF4-FFF2-40B4-BE49-F238E27FC236}">
+                <a16:creationId xmlns:a16="http://schemas.microsoft.com/office/drawing/2014/main" id="{D89E6012-84EB-FE69-715D-A362EB7C0045}"/>
+              </a:ext>
+            </a:extLst>
+          </p:cNvPr>
+          <p:cNvPicPr>
+            <a:picLocks noChangeAspect="1"/>
+          </p:cNvPicPr>
+          <p:nvPr/>
+        </p:nvPicPr>
+        <p:blipFill>
+          <a:blip r:embed="rId2"/>
+          <a:stretch>
+            <a:fillRect/>
+          </a:stretch>
+        </p:blipFill>
+        <p:spPr>
+          <a:xfrm>
+            <a:off x="948558" y="1965434"/>
+            <a:ext cx="10743381" cy="2704692"/>
+          </a:xfrm>
+          <a:prstGeom prst="rect">
+            <a:avLst/>
+          </a:prstGeom>
+        </p:spPr>
+      </p:pic>
+      <p:sp>
+        <p:nvSpPr>
+          <p:cNvPr id="3" name="TextBox 2">
+            <a:extLst>
+              <a:ext uri="{FF2B5EF4-FFF2-40B4-BE49-F238E27FC236}">
+                <a16:creationId xmlns:a16="http://schemas.microsoft.com/office/drawing/2014/main" id="{2063DB09-F118-F601-A9B2-53BB088FEDAA}"/>
+              </a:ext>
+            </a:extLst>
+          </p:cNvPr>
+          <p:cNvSpPr txBox="1"/>
+          <p:nvPr/>
+        </p:nvSpPr>
+        <p:spPr>
+          <a:xfrm>
+            <a:off x="201009" y="4876753"/>
+            <a:ext cx="3209533" cy="246221"/>
+          </a:xfrm>
+          <a:prstGeom prst="rect">
+            <a:avLst/>
+          </a:prstGeom>
+          <a:noFill/>
+        </p:spPr>
+        <p:txBody>
+          <a:bodyPr wrap="none" rtlCol="0">
+            <a:spAutoFit/>
+          </a:bodyPr>
+          <a:lstStyle/>
+          <a:p>
+            <a:r>
+              <a:rPr lang="en-US" sz="1000" dirty="0">
+                <a:solidFill>
+                  <a:schemeClr val="bg1">
+                    <a:lumMod val="75000"/>
+                  </a:schemeClr>
+                </a:solidFill>
+                <a:latin typeface="Avenir Book" panose="02000503020000020003" pitchFamily="2" charset="0"/>
+              </a:rPr>
+              <a:t>figures-0 : 4-bit local quantum Fourier transformation</a:t>
+            </a:r>
+            <a:endParaRPr lang="en-US" sz="800" dirty="0">
+              <a:solidFill>
+                <a:schemeClr val="bg1">
+                  <a:lumMod val="75000"/>
+                </a:schemeClr>
+              </a:solidFill>
+              <a:latin typeface="Avenir Book" panose="02000503020000020003" pitchFamily="2" charset="0"/>
+            </a:endParaRPr>
+          </a:p>
+        </p:txBody>
+      </p:sp>
+    </p:spTree>
+    <p:extLst>
+      <p:ext uri="{BB962C8B-B14F-4D97-AF65-F5344CB8AC3E}">
+        <p14:creationId xmlns:p14="http://schemas.microsoft.com/office/powerpoint/2010/main" val="2275931222"/>
+      </p:ext>
+    </p:extLst>
+  </p:cSld>
+  <p:clrMapOvr>
+    <a:masterClrMapping/>
+  </p:clrMapOvr>
+</p:sld>
+</file>
+
+<file path=ppt/slides/slide2.xml><?xml version="1.0" encoding="utf-8"?>
+<p:sld xmlns:a="http://schemas.openxmlformats.org/drawingml/2006/main" xmlns:r="http://schemas.openxmlformats.org/officeDocument/2006/relationships" xmlns:p="http://schemas.openxmlformats.org/presentationml/2006/main">
+  <p:cSld>
+    <p:spTree>
+      <p:nvGrpSpPr>
+        <p:cNvPr id="1" name=""/>
+        <p:cNvGrpSpPr/>
+        <p:nvPr/>
+      </p:nvGrpSpPr>
+      <p:grpSpPr>
+        <a:xfrm>
+          <a:off x="0" y="0"/>
+          <a:ext cx="0" cy="0"/>
+          <a:chOff x="0" y="0"/>
+          <a:chExt cx="0" cy="0"/>
+        </a:xfrm>
+      </p:grpSpPr>
       <p:pic>
         <p:nvPicPr>
           <p:cNvPr id="2" name="Picture 1">
@@ -3798,7 +3962,7 @@
         <p:spPr>
           <a:xfrm>
             <a:off x="201009" y="6075484"/>
-            <a:ext cx="2473754" cy="246221"/>
+            <a:ext cx="2444900" cy="246221"/>
           </a:xfrm>
           <a:prstGeom prst="rect">
             <a:avLst/>
@@ -3820,7 +3984,7 @@
                 </a:solidFill>
                 <a:latin typeface="Avenir Book" panose="02000503020000020003" pitchFamily="2" charset="0"/>
               </a:rPr>
-              <a:t>figures-0 : Quantum Processor Registers</a:t>
+              <a:t>figures-1 : quantum processor registers</a:t>
             </a:r>
             <a:endParaRPr lang="en-US" sz="800" dirty="0">
               <a:solidFill>
@@ -3837,130 +4001,6 @@
     <p:extLst>
       <p:ext uri="{BB962C8B-B14F-4D97-AF65-F5344CB8AC3E}">
         <p14:creationId xmlns:p14="http://schemas.microsoft.com/office/powerpoint/2010/main" val="3810293133"/>
-      </p:ext>
-    </p:extLst>
-  </p:cSld>
-  <p:clrMapOvr>
-    <a:masterClrMapping/>
-  </p:clrMapOvr>
-</p:sld>
-</file>
-
-<file path=ppt/slides/slide2.xml><?xml version="1.0" encoding="utf-8"?>
-<p:sld xmlns:a="http://schemas.openxmlformats.org/drawingml/2006/main" xmlns:r="http://schemas.openxmlformats.org/officeDocument/2006/relationships" xmlns:p="http://schemas.openxmlformats.org/presentationml/2006/main">
-  <p:cSld>
-    <p:spTree>
-      <p:nvGrpSpPr>
-        <p:cNvPr id="1" name=""/>
-        <p:cNvGrpSpPr/>
-        <p:nvPr/>
-      </p:nvGrpSpPr>
-      <p:grpSpPr>
-        <a:xfrm>
-          <a:off x="0" y="0"/>
-          <a:ext cx="0" cy="0"/>
-          <a:chOff x="0" y="0"/>
-          <a:chExt cx="0" cy="0"/>
-        </a:xfrm>
-      </p:grpSpPr>
-      <p:sp>
-        <p:nvSpPr>
-          <p:cNvPr id="8" name="TextBox 7">
-            <a:extLst>
-              <a:ext uri="{FF2B5EF4-FFF2-40B4-BE49-F238E27FC236}">
-                <a16:creationId xmlns:a16="http://schemas.microsoft.com/office/drawing/2014/main" id="{963AD41F-43C9-2E27-AE48-2BFB88732422}"/>
-              </a:ext>
-            </a:extLst>
-          </p:cNvPr>
-          <p:cNvSpPr txBox="1"/>
-          <p:nvPr/>
-        </p:nvSpPr>
-        <p:spPr>
-          <a:xfrm>
-            <a:off x="5417769" y="3238292"/>
-            <a:ext cx="1356462" cy="338554"/>
-          </a:xfrm>
-          <a:prstGeom prst="rect">
-            <a:avLst/>
-          </a:prstGeom>
-          <a:noFill/>
-        </p:spPr>
-        <p:txBody>
-          <a:bodyPr wrap="none" rtlCol="0">
-            <a:spAutoFit/>
-          </a:bodyPr>
-          <a:lstStyle/>
-          <a:p>
-            <a:r>
-              <a:rPr lang="en-US" sz="1600" dirty="0">
-                <a:latin typeface="Avenir Book" panose="02000503020000020003" pitchFamily="2" charset="0"/>
-              </a:rPr>
-              <a:t>Second slide</a:t>
-            </a:r>
-            <a:endParaRPr lang="en-US" sz="1200" dirty="0">
-              <a:latin typeface="Avenir Book" panose="02000503020000020003" pitchFamily="2" charset="0"/>
-            </a:endParaRPr>
-          </a:p>
-        </p:txBody>
-      </p:sp>
-      <p:sp>
-        <p:nvSpPr>
-          <p:cNvPr id="12" name="Rectangle 11">
-            <a:extLst>
-              <a:ext uri="{FF2B5EF4-FFF2-40B4-BE49-F238E27FC236}">
-                <a16:creationId xmlns:a16="http://schemas.microsoft.com/office/drawing/2014/main" id="{53A239F0-9EF5-41F4-B7C9-9C3B5BB509D1}"/>
-              </a:ext>
-            </a:extLst>
-          </p:cNvPr>
-          <p:cNvSpPr/>
-          <p:nvPr/>
-        </p:nvSpPr>
-        <p:spPr>
-          <a:xfrm>
-            <a:off x="171450" y="471488"/>
-            <a:ext cx="11872913" cy="5872162"/>
-          </a:xfrm>
-          <a:prstGeom prst="rect">
-            <a:avLst/>
-          </a:prstGeom>
-          <a:noFill/>
-          <a:ln>
-            <a:solidFill>
-              <a:schemeClr val="bg1">
-                <a:lumMod val="85000"/>
-              </a:schemeClr>
-            </a:solidFill>
-          </a:ln>
-        </p:spPr>
-        <p:style>
-          <a:lnRef idx="2">
-            <a:schemeClr val="accent1">
-              <a:shade val="50000"/>
-            </a:schemeClr>
-          </a:lnRef>
-          <a:fillRef idx="1">
-            <a:schemeClr val="accent1"/>
-          </a:fillRef>
-          <a:effectRef idx="0">
-            <a:schemeClr val="accent1"/>
-          </a:effectRef>
-          <a:fontRef idx="minor">
-            <a:schemeClr val="lt1"/>
-          </a:fontRef>
-        </p:style>
-        <p:txBody>
-          <a:bodyPr rtlCol="0" anchor="ctr"/>
-          <a:lstStyle/>
-          <a:p>
-            <a:pPr algn="ctr"/>
-            <a:endParaRPr lang="en-US"/>
-          </a:p>
-        </p:txBody>
-      </p:sp>
-    </p:spTree>
-    <p:extLst>
-      <p:ext uri="{BB962C8B-B14F-4D97-AF65-F5344CB8AC3E}">
-        <p14:creationId xmlns:p14="http://schemas.microsoft.com/office/powerpoint/2010/main" val="2275931222"/>
       </p:ext>
     </p:extLst>
   </p:cSld>

</xml_diff>

<commit_message>
Add bloch multi-vector QFT example
</commit_message>
<xml_diff>
--- a/docs/figures/figures.pptx
+++ b/docs/figures/figures.pptx
@@ -6,7 +6,8 @@
   </p:sldMasterIdLst>
   <p:sldIdLst>
     <p:sldId id="258" r:id="rId2"/>
-    <p:sldId id="257" r:id="rId3"/>
+    <p:sldId id="259" r:id="rId3"/>
+    <p:sldId id="257" r:id="rId4"/>
   </p:sldIdLst>
   <p:sldSz cx="12192000" cy="6858000"/>
   <p:notesSz cx="6858000" cy="9144000"/>
@@ -3496,6 +3497,170 @@
           <p:cNvPr id="2" name="Picture 1">
             <a:extLst>
               <a:ext uri="{FF2B5EF4-FFF2-40B4-BE49-F238E27FC236}">
+                <a16:creationId xmlns:a16="http://schemas.microsoft.com/office/drawing/2014/main" id="{49C3CE69-8119-3BB7-DA97-9615E5420FA0}"/>
+              </a:ext>
+            </a:extLst>
+          </p:cNvPr>
+          <p:cNvPicPr>
+            <a:picLocks noChangeAspect="1"/>
+          </p:cNvPicPr>
+          <p:nvPr/>
+        </p:nvPicPr>
+        <p:blipFill>
+          <a:blip r:embed="rId2"/>
+          <a:stretch>
+            <a:fillRect/>
+          </a:stretch>
+        </p:blipFill>
+        <p:spPr>
+          <a:xfrm>
+            <a:off x="1134544" y="2140521"/>
+            <a:ext cx="10070486" cy="2576958"/>
+          </a:xfrm>
+          <a:prstGeom prst="rect">
+            <a:avLst/>
+          </a:prstGeom>
+        </p:spPr>
+      </p:pic>
+      <p:sp>
+        <p:nvSpPr>
+          <p:cNvPr id="3" name="Rectangle 2">
+            <a:extLst>
+              <a:ext uri="{FF2B5EF4-FFF2-40B4-BE49-F238E27FC236}">
+                <a16:creationId xmlns:a16="http://schemas.microsoft.com/office/drawing/2014/main" id="{8EC5EBF3-0EC5-F92B-C108-DA02173BFBE6}"/>
+              </a:ext>
+            </a:extLst>
+          </p:cNvPr>
+          <p:cNvSpPr/>
+          <p:nvPr/>
+        </p:nvSpPr>
+        <p:spPr>
+          <a:xfrm>
+            <a:off x="171450" y="1660634"/>
+            <a:ext cx="11872913" cy="3493870"/>
+          </a:xfrm>
+          <a:prstGeom prst="rect">
+            <a:avLst/>
+          </a:prstGeom>
+          <a:noFill/>
+          <a:ln>
+            <a:solidFill>
+              <a:schemeClr val="bg1">
+                <a:lumMod val="85000"/>
+              </a:schemeClr>
+            </a:solidFill>
+          </a:ln>
+        </p:spPr>
+        <p:style>
+          <a:lnRef idx="2">
+            <a:schemeClr val="accent1">
+              <a:shade val="50000"/>
+            </a:schemeClr>
+          </a:lnRef>
+          <a:fillRef idx="1">
+            <a:schemeClr val="accent1"/>
+          </a:fillRef>
+          <a:effectRef idx="0">
+            <a:schemeClr val="accent1"/>
+          </a:effectRef>
+          <a:fontRef idx="minor">
+            <a:schemeClr val="lt1"/>
+          </a:fontRef>
+        </p:style>
+        <p:txBody>
+          <a:bodyPr rtlCol="0" anchor="ctr"/>
+          <a:lstStyle/>
+          <a:p>
+            <a:pPr algn="ctr"/>
+            <a:endParaRPr lang="en-US"/>
+          </a:p>
+        </p:txBody>
+      </p:sp>
+      <p:sp>
+        <p:nvSpPr>
+          <p:cNvPr id="4" name="TextBox 3">
+            <a:extLst>
+              <a:ext uri="{FF2B5EF4-FFF2-40B4-BE49-F238E27FC236}">
+                <a16:creationId xmlns:a16="http://schemas.microsoft.com/office/drawing/2014/main" id="{D1E2D570-0021-0772-9537-D4427AC2480F}"/>
+              </a:ext>
+            </a:extLst>
+          </p:cNvPr>
+          <p:cNvSpPr txBox="1"/>
+          <p:nvPr/>
+        </p:nvSpPr>
+        <p:spPr>
+          <a:xfrm>
+            <a:off x="201009" y="4876753"/>
+            <a:ext cx="3316934" cy="246221"/>
+          </a:xfrm>
+          <a:prstGeom prst="rect">
+            <a:avLst/>
+          </a:prstGeom>
+          <a:noFill/>
+        </p:spPr>
+        <p:txBody>
+          <a:bodyPr wrap="none" rtlCol="0">
+            <a:spAutoFit/>
+          </a:bodyPr>
+          <a:lstStyle/>
+          <a:p>
+            <a:r>
+              <a:rPr lang="en-US" sz="1000" dirty="0">
+                <a:solidFill>
+                  <a:schemeClr val="bg1">
+                    <a:lumMod val="75000"/>
+                  </a:schemeClr>
+                </a:solidFill>
+                <a:latin typeface="Avenir Book" panose="02000503020000020003" pitchFamily="2" charset="0"/>
+              </a:rPr>
+              <a:t>figures-1 : Bloch multi-vector for 4-bit QFT with input 3</a:t>
+            </a:r>
+            <a:endParaRPr lang="en-US" sz="800" dirty="0">
+              <a:solidFill>
+                <a:schemeClr val="bg1">
+                  <a:lumMod val="75000"/>
+                </a:schemeClr>
+              </a:solidFill>
+              <a:latin typeface="Avenir Book" panose="02000503020000020003" pitchFamily="2" charset="0"/>
+            </a:endParaRPr>
+          </a:p>
+        </p:txBody>
+      </p:sp>
+    </p:spTree>
+    <p:extLst>
+      <p:ext uri="{BB962C8B-B14F-4D97-AF65-F5344CB8AC3E}">
+        <p14:creationId xmlns:p14="http://schemas.microsoft.com/office/powerpoint/2010/main" val="3874470473"/>
+      </p:ext>
+    </p:extLst>
+  </p:cSld>
+  <p:clrMapOvr>
+    <a:masterClrMapping/>
+  </p:clrMapOvr>
+</p:sld>
+</file>
+
+<file path=ppt/slides/slide3.xml><?xml version="1.0" encoding="utf-8"?>
+<p:sld xmlns:a="http://schemas.openxmlformats.org/drawingml/2006/main" xmlns:r="http://schemas.openxmlformats.org/officeDocument/2006/relationships" xmlns:p="http://schemas.openxmlformats.org/presentationml/2006/main">
+  <p:cSld>
+    <p:spTree>
+      <p:nvGrpSpPr>
+        <p:cNvPr id="1" name=""/>
+        <p:cNvGrpSpPr/>
+        <p:nvPr/>
+      </p:nvGrpSpPr>
+      <p:grpSpPr>
+        <a:xfrm>
+          <a:off x="0" y="0"/>
+          <a:ext cx="0" cy="0"/>
+          <a:chOff x="0" y="0"/>
+          <a:chExt cx="0" cy="0"/>
+        </a:xfrm>
+      </p:grpSpPr>
+      <p:pic>
+        <p:nvPicPr>
+          <p:cNvPr id="2" name="Picture 1">
+            <a:extLst>
+              <a:ext uri="{FF2B5EF4-FFF2-40B4-BE49-F238E27FC236}">
                 <a16:creationId xmlns:a16="http://schemas.microsoft.com/office/drawing/2014/main" id="{04528B67-5DEC-A5F2-1649-7CA6599B2895}"/>
               </a:ext>
             </a:extLst>
@@ -3962,7 +4127,7 @@
         <p:spPr>
           <a:xfrm>
             <a:off x="201009" y="6075484"/>
-            <a:ext cx="2444900" cy="246221"/>
+            <a:ext cx="2417650" cy="246221"/>
           </a:xfrm>
           <a:prstGeom prst="rect">
             <a:avLst/>
@@ -3984,7 +4149,7 @@
                 </a:solidFill>
                 <a:latin typeface="Avenir Book" panose="02000503020000020003" pitchFamily="2" charset="0"/>
               </a:rPr>
-              <a:t>figures-1 : quantum processor registers</a:t>
+              <a:t>figures-2 : quantum processor registers</a:t>
             </a:r>
             <a:endParaRPr lang="en-US" sz="800" dirty="0">
               <a:solidFill>

</xml_diff>

<commit_message>
Add city plot example for QFT
</commit_message>
<xml_diff>
--- a/docs/figures/figures.pptx
+++ b/docs/figures/figures.pptx
@@ -7,7 +7,8 @@
   <p:sldIdLst>
     <p:sldId id="258" r:id="rId2"/>
     <p:sldId id="259" r:id="rId3"/>
-    <p:sldId id="257" r:id="rId4"/>
+    <p:sldId id="260" r:id="rId4"/>
+    <p:sldId id="257" r:id="rId5"/>
   </p:sldIdLst>
   <p:sldSz cx="12192000" cy="6858000"/>
   <p:notesSz cx="6858000" cy="9144000"/>
@@ -3661,6 +3662,170 @@
           <p:cNvPr id="2" name="Picture 1">
             <a:extLst>
               <a:ext uri="{FF2B5EF4-FFF2-40B4-BE49-F238E27FC236}">
+                <a16:creationId xmlns:a16="http://schemas.microsoft.com/office/drawing/2014/main" id="{1460B762-9644-4936-210D-81AD5A52D13D}"/>
+              </a:ext>
+            </a:extLst>
+          </p:cNvPr>
+          <p:cNvPicPr>
+            <a:picLocks noChangeAspect="1"/>
+          </p:cNvPicPr>
+          <p:nvPr/>
+        </p:nvPicPr>
+        <p:blipFill>
+          <a:blip r:embed="rId2"/>
+          <a:stretch>
+            <a:fillRect/>
+          </a:stretch>
+        </p:blipFill>
+        <p:spPr>
+          <a:xfrm>
+            <a:off x="1663262" y="1460937"/>
+            <a:ext cx="9343728" cy="3603411"/>
+          </a:xfrm>
+          <a:prstGeom prst="rect">
+            <a:avLst/>
+          </a:prstGeom>
+        </p:spPr>
+      </p:pic>
+      <p:sp>
+        <p:nvSpPr>
+          <p:cNvPr id="3" name="Rectangle 2">
+            <a:extLst>
+              <a:ext uri="{FF2B5EF4-FFF2-40B4-BE49-F238E27FC236}">
+                <a16:creationId xmlns:a16="http://schemas.microsoft.com/office/drawing/2014/main" id="{421FE0EC-03B0-0015-3D11-701461754577}"/>
+              </a:ext>
+            </a:extLst>
+          </p:cNvPr>
+          <p:cNvSpPr/>
+          <p:nvPr/>
+        </p:nvSpPr>
+        <p:spPr>
+          <a:xfrm>
+            <a:off x="171450" y="1660634"/>
+            <a:ext cx="11872913" cy="3493870"/>
+          </a:xfrm>
+          <a:prstGeom prst="rect">
+            <a:avLst/>
+          </a:prstGeom>
+          <a:noFill/>
+          <a:ln>
+            <a:solidFill>
+              <a:schemeClr val="bg1">
+                <a:lumMod val="85000"/>
+              </a:schemeClr>
+            </a:solidFill>
+          </a:ln>
+        </p:spPr>
+        <p:style>
+          <a:lnRef idx="2">
+            <a:schemeClr val="accent1">
+              <a:shade val="50000"/>
+            </a:schemeClr>
+          </a:lnRef>
+          <a:fillRef idx="1">
+            <a:schemeClr val="accent1"/>
+          </a:fillRef>
+          <a:effectRef idx="0">
+            <a:schemeClr val="accent1"/>
+          </a:effectRef>
+          <a:fontRef idx="minor">
+            <a:schemeClr val="lt1"/>
+          </a:fontRef>
+        </p:style>
+        <p:txBody>
+          <a:bodyPr rtlCol="0" anchor="ctr"/>
+          <a:lstStyle/>
+          <a:p>
+            <a:pPr algn="ctr"/>
+            <a:endParaRPr lang="en-US"/>
+          </a:p>
+        </p:txBody>
+      </p:sp>
+      <p:sp>
+        <p:nvSpPr>
+          <p:cNvPr id="4" name="TextBox 3">
+            <a:extLst>
+              <a:ext uri="{FF2B5EF4-FFF2-40B4-BE49-F238E27FC236}">
+                <a16:creationId xmlns:a16="http://schemas.microsoft.com/office/drawing/2014/main" id="{EED4190C-48A5-0B8A-E7FE-5459AA1721BB}"/>
+              </a:ext>
+            </a:extLst>
+          </p:cNvPr>
+          <p:cNvSpPr txBox="1"/>
+          <p:nvPr/>
+        </p:nvSpPr>
+        <p:spPr>
+          <a:xfrm>
+            <a:off x="201009" y="4876753"/>
+            <a:ext cx="3592650" cy="246221"/>
+          </a:xfrm>
+          <a:prstGeom prst="rect">
+            <a:avLst/>
+          </a:prstGeom>
+          <a:noFill/>
+        </p:spPr>
+        <p:txBody>
+          <a:bodyPr wrap="none" rtlCol="0">
+            <a:spAutoFit/>
+          </a:bodyPr>
+          <a:lstStyle/>
+          <a:p>
+            <a:r>
+              <a:rPr lang="en-US" sz="1000" dirty="0">
+                <a:solidFill>
+                  <a:schemeClr val="bg1">
+                    <a:lumMod val="75000"/>
+                  </a:schemeClr>
+                </a:solidFill>
+                <a:latin typeface="Avenir Book" panose="02000503020000020003" pitchFamily="2" charset="0"/>
+              </a:rPr>
+              <a:t>figures-2 : Density matrix city plot for 4-bit QFT with input 3</a:t>
+            </a:r>
+            <a:endParaRPr lang="en-US" sz="800" dirty="0">
+              <a:solidFill>
+                <a:schemeClr val="bg1">
+                  <a:lumMod val="75000"/>
+                </a:schemeClr>
+              </a:solidFill>
+              <a:latin typeface="Avenir Book" panose="02000503020000020003" pitchFamily="2" charset="0"/>
+            </a:endParaRPr>
+          </a:p>
+        </p:txBody>
+      </p:sp>
+    </p:spTree>
+    <p:extLst>
+      <p:ext uri="{BB962C8B-B14F-4D97-AF65-F5344CB8AC3E}">
+        <p14:creationId xmlns:p14="http://schemas.microsoft.com/office/powerpoint/2010/main" val="1268461441"/>
+      </p:ext>
+    </p:extLst>
+  </p:cSld>
+  <p:clrMapOvr>
+    <a:masterClrMapping/>
+  </p:clrMapOvr>
+</p:sld>
+</file>
+
+<file path=ppt/slides/slide4.xml><?xml version="1.0" encoding="utf-8"?>
+<p:sld xmlns:a="http://schemas.openxmlformats.org/drawingml/2006/main" xmlns:r="http://schemas.openxmlformats.org/officeDocument/2006/relationships" xmlns:p="http://schemas.openxmlformats.org/presentationml/2006/main">
+  <p:cSld>
+    <p:spTree>
+      <p:nvGrpSpPr>
+        <p:cNvPr id="1" name=""/>
+        <p:cNvGrpSpPr/>
+        <p:nvPr/>
+      </p:nvGrpSpPr>
+      <p:grpSpPr>
+        <a:xfrm>
+          <a:off x="0" y="0"/>
+          <a:ext cx="0" cy="0"/>
+          <a:chOff x="0" y="0"/>
+          <a:chExt cx="0" cy="0"/>
+        </a:xfrm>
+      </p:grpSpPr>
+      <p:pic>
+        <p:nvPicPr>
+          <p:cNvPr id="2" name="Picture 1">
+            <a:extLst>
+              <a:ext uri="{FF2B5EF4-FFF2-40B4-BE49-F238E27FC236}">
                 <a16:creationId xmlns:a16="http://schemas.microsoft.com/office/drawing/2014/main" id="{04528B67-5DEC-A5F2-1649-7CA6599B2895}"/>
               </a:ext>
             </a:extLst>
@@ -4149,7 +4314,7 @@
                 </a:solidFill>
                 <a:latin typeface="Avenir Book" panose="02000503020000020003" pitchFamily="2" charset="0"/>
               </a:rPr>
-              <a:t>figures-2 : quantum processor registers</a:t>
+              <a:t>figures-3 : quantum processor registers</a:t>
             </a:r>
             <a:endParaRPr lang="en-US" sz="800" dirty="0">
               <a:solidFill>

</xml_diff>

<commit_message>
Progress monolothic computer docs
</commit_message>
<xml_diff>
--- a/docs/figures/figures.pptx
+++ b/docs/figures/figures.pptx
@@ -6,10 +6,11 @@
   </p:sldMasterIdLst>
   <p:sldIdLst>
     <p:sldId id="261" r:id="rId2"/>
-    <p:sldId id="257" r:id="rId3"/>
-    <p:sldId id="258" r:id="rId4"/>
-    <p:sldId id="259" r:id="rId5"/>
-    <p:sldId id="260" r:id="rId6"/>
+    <p:sldId id="262" r:id="rId3"/>
+    <p:sldId id="257" r:id="rId4"/>
+    <p:sldId id="258" r:id="rId5"/>
+    <p:sldId id="259" r:id="rId6"/>
+    <p:sldId id="260" r:id="rId7"/>
   </p:sldIdLst>
   <p:sldSz cx="12192000" cy="6858000"/>
   <p:notesSz cx="6858000" cy="9144000"/>
@@ -3499,6 +3500,169 @@
           <p:cNvPr id="2" name="Picture 1">
             <a:extLst>
               <a:ext uri="{FF2B5EF4-FFF2-40B4-BE49-F238E27FC236}">
+                <a16:creationId xmlns:a16="http://schemas.microsoft.com/office/drawing/2014/main" id="{5A721D89-8512-1A54-CCE7-BF33F68AC049}"/>
+              </a:ext>
+            </a:extLst>
+          </p:cNvPr>
+          <p:cNvPicPr>
+            <a:picLocks noChangeAspect="1"/>
+          </p:cNvPicPr>
+          <p:nvPr/>
+        </p:nvPicPr>
+        <p:blipFill rotWithShape="1">
+          <a:blip r:embed="rId2"/>
+          <a:srcRect t="5574" b="9658"/>
+          <a:stretch/>
+        </p:blipFill>
+        <p:spPr>
+          <a:xfrm>
+            <a:off x="2318844" y="2271789"/>
+            <a:ext cx="7596352" cy="2788125"/>
+          </a:xfrm>
+          <a:prstGeom prst="rect">
+            <a:avLst/>
+          </a:prstGeom>
+        </p:spPr>
+      </p:pic>
+      <p:sp>
+        <p:nvSpPr>
+          <p:cNvPr id="3" name="Rectangle 2">
+            <a:extLst>
+              <a:ext uri="{FF2B5EF4-FFF2-40B4-BE49-F238E27FC236}">
+                <a16:creationId xmlns:a16="http://schemas.microsoft.com/office/drawing/2014/main" id="{BE14CBF2-3870-B1E9-A08B-93053CCD553E}"/>
+              </a:ext>
+            </a:extLst>
+          </p:cNvPr>
+          <p:cNvSpPr/>
+          <p:nvPr/>
+        </p:nvSpPr>
+        <p:spPr>
+          <a:xfrm>
+            <a:off x="171450" y="2192632"/>
+            <a:ext cx="11872913" cy="2961871"/>
+          </a:xfrm>
+          <a:prstGeom prst="rect">
+            <a:avLst/>
+          </a:prstGeom>
+          <a:noFill/>
+          <a:ln>
+            <a:solidFill>
+              <a:schemeClr val="bg1">
+                <a:lumMod val="85000"/>
+              </a:schemeClr>
+            </a:solidFill>
+          </a:ln>
+        </p:spPr>
+        <p:style>
+          <a:lnRef idx="2">
+            <a:schemeClr val="accent1">
+              <a:shade val="50000"/>
+            </a:schemeClr>
+          </a:lnRef>
+          <a:fillRef idx="1">
+            <a:schemeClr val="accent1"/>
+          </a:fillRef>
+          <a:effectRef idx="0">
+            <a:schemeClr val="accent1"/>
+          </a:effectRef>
+          <a:fontRef idx="minor">
+            <a:schemeClr val="lt1"/>
+          </a:fontRef>
+        </p:style>
+        <p:txBody>
+          <a:bodyPr rtlCol="0" anchor="ctr"/>
+          <a:lstStyle/>
+          <a:p>
+            <a:pPr algn="ctr"/>
+            <a:endParaRPr lang="en-US"/>
+          </a:p>
+        </p:txBody>
+      </p:sp>
+      <p:sp>
+        <p:nvSpPr>
+          <p:cNvPr id="4" name="TextBox 3">
+            <a:extLst>
+              <a:ext uri="{FF2B5EF4-FFF2-40B4-BE49-F238E27FC236}">
+                <a16:creationId xmlns:a16="http://schemas.microsoft.com/office/drawing/2014/main" id="{93680331-AFCC-9A12-8B40-B57B1F73567F}"/>
+              </a:ext>
+            </a:extLst>
+          </p:cNvPr>
+          <p:cNvSpPr txBox="1"/>
+          <p:nvPr/>
+        </p:nvSpPr>
+        <p:spPr>
+          <a:xfrm>
+            <a:off x="201009" y="4876753"/>
+            <a:ext cx="3050835" cy="246221"/>
+          </a:xfrm>
+          <a:prstGeom prst="rect">
+            <a:avLst/>
+          </a:prstGeom>
+          <a:noFill/>
+        </p:spPr>
+        <p:txBody>
+          <a:bodyPr wrap="none" rtlCol="0">
+            <a:spAutoFit/>
+          </a:bodyPr>
+          <a:lstStyle/>
+          <a:p>
+            <a:r>
+              <a:rPr lang="en-US" sz="1000" dirty="0">
+                <a:solidFill>
+                  <a:schemeClr val="bg1">
+                    <a:lumMod val="75000"/>
+                  </a:schemeClr>
+                </a:solidFill>
+                <a:latin typeface="Avenir Book" panose="02000503020000020003" pitchFamily="2" charset="0"/>
+              </a:rPr>
+              <a:t>figures-1 : monolithic-quantum-computer-city-plot</a:t>
+            </a:r>
+            <a:endParaRPr lang="en-US" sz="800" dirty="0">
+              <a:solidFill>
+                <a:schemeClr val="bg1">
+                  <a:lumMod val="75000"/>
+                </a:schemeClr>
+              </a:solidFill>
+              <a:latin typeface="Avenir Book" panose="02000503020000020003" pitchFamily="2" charset="0"/>
+            </a:endParaRPr>
+          </a:p>
+        </p:txBody>
+      </p:sp>
+    </p:spTree>
+    <p:extLst>
+      <p:ext uri="{BB962C8B-B14F-4D97-AF65-F5344CB8AC3E}">
+        <p14:creationId xmlns:p14="http://schemas.microsoft.com/office/powerpoint/2010/main" val="2160490511"/>
+      </p:ext>
+    </p:extLst>
+  </p:cSld>
+  <p:clrMapOvr>
+    <a:masterClrMapping/>
+  </p:clrMapOvr>
+</p:sld>
+</file>
+
+<file path=ppt/slides/slide3.xml><?xml version="1.0" encoding="utf-8"?>
+<p:sld xmlns:a="http://schemas.openxmlformats.org/drawingml/2006/main" xmlns:r="http://schemas.openxmlformats.org/officeDocument/2006/relationships" xmlns:p="http://schemas.openxmlformats.org/presentationml/2006/main">
+  <p:cSld>
+    <p:spTree>
+      <p:nvGrpSpPr>
+        <p:cNvPr id="1" name=""/>
+        <p:cNvGrpSpPr/>
+        <p:nvPr/>
+      </p:nvGrpSpPr>
+      <p:grpSpPr>
+        <a:xfrm>
+          <a:off x="0" y="0"/>
+          <a:ext cx="0" cy="0"/>
+          <a:chOff x="0" y="0"/>
+          <a:chExt cx="0" cy="0"/>
+        </a:xfrm>
+      </p:grpSpPr>
+      <p:pic>
+        <p:nvPicPr>
+          <p:cNvPr id="2" name="Picture 1">
+            <a:extLst>
+              <a:ext uri="{FF2B5EF4-FFF2-40B4-BE49-F238E27FC236}">
                 <a16:creationId xmlns:a16="http://schemas.microsoft.com/office/drawing/2014/main" id="{04528B67-5DEC-A5F2-1649-7CA6599B2895}"/>
               </a:ext>
             </a:extLst>
@@ -3987,7 +4151,7 @@
                 </a:solidFill>
                 <a:latin typeface="Avenir Book" panose="02000503020000020003" pitchFamily="2" charset="0"/>
               </a:rPr>
-              <a:t>figures-1 : quantum processor registers</a:t>
+              <a:t>figures-2 : quantum processor registers</a:t>
             </a:r>
             <a:endParaRPr lang="en-US" sz="800" dirty="0">
               <a:solidFill>
@@ -4013,7 +4177,7 @@
 </p:sld>
 </file>
 
-<file path=ppt/slides/slide3.xml><?xml version="1.0" encoding="utf-8"?>
+<file path=ppt/slides/slide4.xml><?xml version="1.0" encoding="utf-8"?>
 <p:sld xmlns:a="http://schemas.openxmlformats.org/drawingml/2006/main" xmlns:r="http://schemas.openxmlformats.org/officeDocument/2006/relationships" xmlns:p="http://schemas.openxmlformats.org/presentationml/2006/main">
   <p:cSld>
     <p:spTree>
@@ -4151,7 +4315,7 @@
                 </a:solidFill>
                 <a:latin typeface="Avenir Book" panose="02000503020000020003" pitchFamily="2" charset="0"/>
               </a:rPr>
-              <a:t>figures-2 : 4-bit local quantum Fourier transformation</a:t>
+              <a:t>figures-3 : 4-bit local quantum Fourier transformation</a:t>
             </a:r>
             <a:endParaRPr lang="en-US" sz="800" dirty="0">
               <a:solidFill>
@@ -4177,7 +4341,7 @@
 </p:sld>
 </file>
 
-<file path=ppt/slides/slide4.xml><?xml version="1.0" encoding="utf-8"?>
+<file path=ppt/slides/slide5.xml><?xml version="1.0" encoding="utf-8"?>
 <p:sld xmlns:a="http://schemas.openxmlformats.org/drawingml/2006/main" xmlns:r="http://schemas.openxmlformats.org/officeDocument/2006/relationships" xmlns:p="http://schemas.openxmlformats.org/presentationml/2006/main">
   <p:cSld>
     <p:spTree>
@@ -4315,7 +4479,7 @@
                 </a:solidFill>
                 <a:latin typeface="Avenir Book" panose="02000503020000020003" pitchFamily="2" charset="0"/>
               </a:rPr>
-              <a:t>figures-3 : Bloch multi-vector for 4-bit QFT with input 3</a:t>
+              <a:t>figures-4 : Bloch multi-vector for 4-bit QFT with input 3</a:t>
             </a:r>
             <a:endParaRPr lang="en-US" sz="800" dirty="0">
               <a:solidFill>
@@ -4341,7 +4505,7 @@
 </p:sld>
 </file>
 
-<file path=ppt/slides/slide5.xml><?xml version="1.0" encoding="utf-8"?>
+<file path=ppt/slides/slide6.xml><?xml version="1.0" encoding="utf-8"?>
 <p:sld xmlns:a="http://schemas.openxmlformats.org/drawingml/2006/main" xmlns:r="http://schemas.openxmlformats.org/officeDocument/2006/relationships" xmlns:p="http://schemas.openxmlformats.org/presentationml/2006/main">
   <p:cSld>
     <p:spTree>
@@ -4471,17 +4635,6 @@
           <a:lstStyle/>
           <a:p>
             <a:r>
-              <a:rPr lang="en-US" sz="1000">
-                <a:solidFill>
-                  <a:schemeClr val="bg1">
-                    <a:lumMod val="75000"/>
-                  </a:schemeClr>
-                </a:solidFill>
-                <a:latin typeface="Avenir Book" panose="02000503020000020003" pitchFamily="2" charset="0"/>
-              </a:rPr>
-              <a:t>figures-4 </a:t>
-            </a:r>
-            <a:r>
               <a:rPr lang="en-US" sz="1000" dirty="0">
                 <a:solidFill>
                   <a:schemeClr val="bg1">
@@ -4490,7 +4643,7 @@
                 </a:solidFill>
                 <a:latin typeface="Avenir Book" panose="02000503020000020003" pitchFamily="2" charset="0"/>
               </a:rPr>
-              <a:t>: Density matrix city plot for 4-bit QFT with input 3</a:t>
+              <a:t>figures-5 : Density matrix city plot for 4-bit QFT with input 3</a:t>
             </a:r>
             <a:endParaRPr lang="en-US" sz="800" dirty="0">
               <a:solidFill>

</xml_diff>